<commit_message>
Update P4 - Continuous Time Markov Chains.pptx
</commit_message>
<xml_diff>
--- a/projects/CTMC/P4 - Continuous Time Markov Chains.pptx
+++ b/projects/CTMC/P4 - Continuous Time Markov Chains.pptx
@@ -5,23 +5,22 @@
     <p:sldMasterId id="2147483660" r:id="rId1"/>
   </p:sldMasterIdLst>
   <p:notesMasterIdLst>
-    <p:notesMasterId r:id="rId16"/>
+    <p:notesMasterId r:id="rId15"/>
   </p:notesMasterIdLst>
   <p:sldIdLst>
     <p:sldId id="256" r:id="rId2"/>
     <p:sldId id="440" r:id="rId3"/>
-    <p:sldId id="441" r:id="rId4"/>
-    <p:sldId id="443" r:id="rId5"/>
-    <p:sldId id="453" r:id="rId6"/>
-    <p:sldId id="455" r:id="rId7"/>
-    <p:sldId id="451" r:id="rId8"/>
-    <p:sldId id="447" r:id="rId9"/>
-    <p:sldId id="446" r:id="rId10"/>
-    <p:sldId id="454" r:id="rId11"/>
-    <p:sldId id="452" r:id="rId12"/>
-    <p:sldId id="449" r:id="rId13"/>
-    <p:sldId id="267" r:id="rId14"/>
-    <p:sldId id="257" r:id="rId15"/>
+    <p:sldId id="443" r:id="rId4"/>
+    <p:sldId id="453" r:id="rId5"/>
+    <p:sldId id="455" r:id="rId6"/>
+    <p:sldId id="451" r:id="rId7"/>
+    <p:sldId id="447" r:id="rId8"/>
+    <p:sldId id="446" r:id="rId9"/>
+    <p:sldId id="454" r:id="rId10"/>
+    <p:sldId id="452" r:id="rId11"/>
+    <p:sldId id="449" r:id="rId12"/>
+    <p:sldId id="267" r:id="rId13"/>
+    <p:sldId id="257" r:id="rId14"/>
   </p:sldIdLst>
   <p:sldSz cx="12192000" cy="6858000"/>
   <p:notesSz cx="6858000" cy="9144000"/>
@@ -629,7 +628,7 @@
           <a:p>
             <a:fld id="{63CC9EBA-D40F-4B2C-8629-D756AD22D0E0}" type="slidenum">
               <a:rPr lang="en-US" smtClean="0"/>
-              <a:t>13</a:t>
+              <a:t>12</a:t>
             </a:fld>
             <a:endParaRPr lang="en-US"/>
           </a:p>
@@ -9782,205 +9781,6 @@
           <p:cNvPr id="2" name="Text Placeholder 1">
             <a:extLst>
               <a:ext uri="{FF2B5EF4-FFF2-40B4-BE49-F238E27FC236}">
-                <a16:creationId xmlns:a16="http://schemas.microsoft.com/office/drawing/2014/main" id="{CA0539D6-7004-49B9-8C98-B1C8FE42827D}"/>
-              </a:ext>
-            </a:extLst>
-          </p:cNvPr>
-          <p:cNvSpPr>
-            <a:spLocks noGrp="1"/>
-          </p:cNvSpPr>
-          <p:nvPr>
-            <p:ph type="body" sz="quarter" idx="13"/>
-          </p:nvPr>
-        </p:nvSpPr>
-        <p:spPr>
-          <a:xfrm>
-            <a:off x="478369" y="1225486"/>
-            <a:ext cx="11474451" cy="3959802"/>
-          </a:xfrm>
-        </p:spPr>
-        <p:txBody>
-          <a:bodyPr/>
-          <a:lstStyle/>
-          <a:p>
-            <a:pPr marL="0" indent="0">
-              <a:lnSpc>
-                <a:spcPct val="150000"/>
-              </a:lnSpc>
-              <a:buNone/>
-            </a:pPr>
-            <a:r>
-              <a:rPr lang="en-US" dirty="0"/>
-              <a:t>For your MDP from project-3:</a:t>
-            </a:r>
-          </a:p>
-          <a:p>
-            <a:pPr marL="457200" indent="-457200">
-              <a:lnSpc>
-                <a:spcPct val="150000"/>
-              </a:lnSpc>
-              <a:buFont typeface="+mj-lt"/>
-              <a:buAutoNum type="arabicPeriod"/>
-            </a:pPr>
-            <a:r>
-              <a:rPr lang="en-US" dirty="0"/>
-              <a:t>Estimate the rates</a:t>
-            </a:r>
-          </a:p>
-          <a:p>
-            <a:pPr marL="697194" lvl="1" indent="-457200">
-              <a:lnSpc>
-                <a:spcPct val="150000"/>
-              </a:lnSpc>
-            </a:pPr>
-            <a:r>
-              <a:rPr lang="en-US" dirty="0"/>
-              <a:t>Sample timestamps from the DTMC (project-3)</a:t>
-            </a:r>
-          </a:p>
-          <a:p>
-            <a:pPr marL="697194" lvl="1" indent="-457200">
-              <a:lnSpc>
-                <a:spcPct val="150000"/>
-              </a:lnSpc>
-            </a:pPr>
-            <a:r>
-              <a:rPr lang="en-US" dirty="0"/>
-              <a:t>Fit the exponential distributions for each transition</a:t>
-            </a:r>
-          </a:p>
-          <a:p>
-            <a:pPr marL="457200" indent="-457200">
-              <a:lnSpc>
-                <a:spcPct val="150000"/>
-              </a:lnSpc>
-              <a:buFont typeface="+mj-lt"/>
-              <a:buAutoNum type="arabicPeriod"/>
-            </a:pPr>
-            <a:r>
-              <a:rPr lang="en-US" dirty="0"/>
-              <a:t>Adapt the code to use the density functions instead of the transition probabilities</a:t>
-            </a:r>
-          </a:p>
-          <a:p>
-            <a:pPr marL="457200" indent="-457200">
-              <a:lnSpc>
-                <a:spcPct val="150000"/>
-              </a:lnSpc>
-              <a:buFont typeface="+mj-lt"/>
-              <a:buAutoNum type="arabicPeriod"/>
-            </a:pPr>
-            <a:r>
-              <a:rPr lang="en-US" dirty="0"/>
-              <a:t>Rerun the same convergence charts </a:t>
-            </a:r>
-          </a:p>
-          <a:p>
-            <a:pPr marL="239994" lvl="1" indent="0">
-              <a:buNone/>
-            </a:pPr>
-            <a:endParaRPr lang="en-US" dirty="0"/>
-          </a:p>
-          <a:p>
-            <a:endParaRPr lang="en-US" dirty="0"/>
-          </a:p>
-        </p:txBody>
-      </p:sp>
-      <p:sp>
-        <p:nvSpPr>
-          <p:cNvPr id="3" name="Title 2">
-            <a:extLst>
-              <a:ext uri="{FF2B5EF4-FFF2-40B4-BE49-F238E27FC236}">
-                <a16:creationId xmlns:a16="http://schemas.microsoft.com/office/drawing/2014/main" id="{3D6EA5F4-01A3-425D-A9A2-E8F701051409}"/>
-              </a:ext>
-            </a:extLst>
-          </p:cNvPr>
-          <p:cNvSpPr>
-            <a:spLocks noGrp="1"/>
-          </p:cNvSpPr>
-          <p:nvPr>
-            <p:ph type="title"/>
-          </p:nvPr>
-        </p:nvSpPr>
-        <p:spPr/>
-        <p:txBody>
-          <a:bodyPr/>
-          <a:lstStyle/>
-          <a:p>
-            <a:r>
-              <a:rPr lang="en-US" dirty="0"/>
-              <a:t>Task-2</a:t>
-            </a:r>
-          </a:p>
-        </p:txBody>
-      </p:sp>
-      <p:sp>
-        <p:nvSpPr>
-          <p:cNvPr id="4" name="Slide Number Placeholder 3">
-            <a:extLst>
-              <a:ext uri="{FF2B5EF4-FFF2-40B4-BE49-F238E27FC236}">
-                <a16:creationId xmlns:a16="http://schemas.microsoft.com/office/drawing/2014/main" id="{875EDB8B-EFD1-4E68-B528-0AD91D9A4887}"/>
-              </a:ext>
-            </a:extLst>
-          </p:cNvPr>
-          <p:cNvSpPr>
-            <a:spLocks noGrp="1"/>
-          </p:cNvSpPr>
-          <p:nvPr>
-            <p:ph type="sldNum" sz="quarter" idx="16"/>
-          </p:nvPr>
-        </p:nvSpPr>
-        <p:spPr/>
-        <p:txBody>
-          <a:bodyPr/>
-          <a:lstStyle/>
-          <a:p>
-            <a:fld id="{1915DC07-6425-4740-9695-FB9F2ED48CC1}" type="slidenum">
-              <a:rPr lang="en-US" smtClean="0"/>
-              <a:t>10</a:t>
-            </a:fld>
-            <a:endParaRPr lang="en-US"/>
-          </a:p>
-        </p:txBody>
-      </p:sp>
-    </p:spTree>
-    <p:extLst>
-      <p:ext uri="{BB962C8B-B14F-4D97-AF65-F5344CB8AC3E}">
-        <p14:creationId xmlns:p14="http://schemas.microsoft.com/office/powerpoint/2010/main" val="3483294274"/>
-      </p:ext>
-    </p:extLst>
-  </p:cSld>
-  <p:clrMapOvr>
-    <a:masterClrMapping/>
-  </p:clrMapOvr>
-  <p:transition>
-    <p:fade/>
-  </p:transition>
-</p:sld>
-</file>
-
-<file path=ppt/slides/slide11.xml><?xml version="1.0" encoding="utf-8"?>
-<p:sld xmlns:a="http://schemas.openxmlformats.org/drawingml/2006/main" xmlns:r="http://schemas.openxmlformats.org/officeDocument/2006/relationships" xmlns:p="http://schemas.openxmlformats.org/presentationml/2006/main">
-  <p:cSld>
-    <p:spTree>
-      <p:nvGrpSpPr>
-        <p:cNvPr id="1" name=""/>
-        <p:cNvGrpSpPr/>
-        <p:nvPr/>
-      </p:nvGrpSpPr>
-      <p:grpSpPr>
-        <a:xfrm>
-          <a:off x="0" y="0"/>
-          <a:ext cx="0" cy="0"/>
-          <a:chOff x="0" y="0"/>
-          <a:chExt cx="0" cy="0"/>
-        </a:xfrm>
-      </p:grpSpPr>
-      <p:sp>
-        <p:nvSpPr>
-          <p:cNvPr id="2" name="Text Placeholder 1">
-            <a:extLst>
-              <a:ext uri="{FF2B5EF4-FFF2-40B4-BE49-F238E27FC236}">
                 <a16:creationId xmlns:a16="http://schemas.microsoft.com/office/drawing/2014/main" id="{9EC535CA-8467-4CEA-9F4D-9653547C4D44}"/>
               </a:ext>
             </a:extLst>
@@ -10125,7 +9925,7 @@
           <a:p>
             <a:fld id="{1915DC07-6425-4740-9695-FB9F2ED48CC1}" type="slidenum">
               <a:rPr lang="en-US" smtClean="0"/>
-              <a:t>11</a:t>
+              <a:t>10</a:t>
             </a:fld>
             <a:endParaRPr lang="en-US"/>
           </a:p>
@@ -10147,7 +9947,7 @@
 </p:sld>
 </file>
 
-<file path=ppt/slides/slide12.xml><?xml version="1.0" encoding="utf-8"?>
+<file path=ppt/slides/slide11.xml><?xml version="1.0" encoding="utf-8"?>
 <p:sld xmlns:a="http://schemas.openxmlformats.org/drawingml/2006/main" xmlns:r="http://schemas.openxmlformats.org/officeDocument/2006/relationships" xmlns:p="http://schemas.openxmlformats.org/presentationml/2006/main">
   <p:cSld>
     <p:spTree>
@@ -10667,7 +10467,7 @@
           <a:p>
             <a:fld id="{1915DC07-6425-4740-9695-FB9F2ED48CC1}" type="slidenum">
               <a:rPr lang="en-US" smtClean="0"/>
-              <a:t>12</a:t>
+              <a:t>11</a:t>
             </a:fld>
             <a:endParaRPr lang="en-US"/>
           </a:p>
@@ -10719,7 +10519,7 @@
 </p:sld>
 </file>
 
-<file path=ppt/slides/slide13.xml><?xml version="1.0" encoding="utf-8"?>
+<file path=ppt/slides/slide12.xml><?xml version="1.0" encoding="utf-8"?>
 <p:sld xmlns:a="http://schemas.openxmlformats.org/drawingml/2006/main" xmlns:r="http://schemas.openxmlformats.org/officeDocument/2006/relationships" xmlns:p="http://schemas.openxmlformats.org/presentationml/2006/main">
   <p:cSld>
     <p:spTree>
@@ -10782,7 +10582,7 @@
 </p:sld>
 </file>
 
-<file path=ppt/slides/slide14.xml><?xml version="1.0" encoding="utf-8"?>
+<file path=ppt/slides/slide13.xml><?xml version="1.0" encoding="utf-8"?>
 <p:sld xmlns:a="http://schemas.openxmlformats.org/drawingml/2006/main" xmlns:r="http://schemas.openxmlformats.org/officeDocument/2006/relationships" xmlns:p="http://schemas.openxmlformats.org/presentationml/2006/main">
   <p:cSld>
     <p:spTree>
@@ -12514,107 +12314,6 @@
           <a:chExt cx="0" cy="0"/>
         </a:xfrm>
       </p:grpSpPr>
-      <p:sp>
-        <p:nvSpPr>
-          <p:cNvPr id="5" name="Title 4">
-            <a:extLst>
-              <a:ext uri="{FF2B5EF4-FFF2-40B4-BE49-F238E27FC236}">
-                <a16:creationId xmlns:a16="http://schemas.microsoft.com/office/drawing/2014/main" id="{BB75297A-0974-46C3-B0C6-82A5EEF1B5D8}"/>
-              </a:ext>
-            </a:extLst>
-          </p:cNvPr>
-          <p:cNvSpPr>
-            <a:spLocks noGrp="1"/>
-          </p:cNvSpPr>
-          <p:nvPr>
-            <p:ph type="ctrTitle"/>
-          </p:nvPr>
-        </p:nvSpPr>
-        <p:spPr>
-          <a:xfrm>
-            <a:off x="478564" y="4707852"/>
-            <a:ext cx="10835609" cy="1001364"/>
-          </a:xfrm>
-          <a:noFill/>
-        </p:spPr>
-        <p:txBody>
-          <a:bodyPr/>
-          <a:lstStyle/>
-          <a:p>
-            <a:r>
-              <a:rPr lang="en-US" dirty="0"/>
-              <a:t>Project-1: Use of DTMC to Predict Event Masking</a:t>
-            </a:r>
-          </a:p>
-        </p:txBody>
-      </p:sp>
-      <p:sp>
-        <p:nvSpPr>
-          <p:cNvPr id="4" name="Slide Number Placeholder 3">
-            <a:extLst>
-              <a:ext uri="{FF2B5EF4-FFF2-40B4-BE49-F238E27FC236}">
-                <a16:creationId xmlns:a16="http://schemas.microsoft.com/office/drawing/2014/main" id="{722BE993-A47B-4BD2-9355-42CD7CDFDE4F}"/>
-              </a:ext>
-            </a:extLst>
-          </p:cNvPr>
-          <p:cNvSpPr>
-            <a:spLocks noGrp="1"/>
-          </p:cNvSpPr>
-          <p:nvPr>
-            <p:ph type="sldNum" sz="quarter" idx="4294967295"/>
-          </p:nvPr>
-        </p:nvSpPr>
-        <p:spPr>
-          <a:xfrm>
-            <a:off x="11420475" y="6486525"/>
-            <a:ext cx="771525" cy="260350"/>
-          </a:xfrm>
-        </p:spPr>
-        <p:txBody>
-          <a:bodyPr/>
-          <a:lstStyle/>
-          <a:p>
-            <a:fld id="{81561042-0DC2-4A04-AA50-F6D44EB20EBA}" type="slidenum">
-              <a:rPr lang="en-US" smtClean="0"/>
-              <a:t>3</a:t>
-            </a:fld>
-            <a:endParaRPr lang="en-US"/>
-          </a:p>
-        </p:txBody>
-      </p:sp>
-    </p:spTree>
-    <p:extLst>
-      <p:ext uri="{BB962C8B-B14F-4D97-AF65-F5344CB8AC3E}">
-        <p14:creationId xmlns:p14="http://schemas.microsoft.com/office/powerpoint/2010/main" val="1860753774"/>
-      </p:ext>
-    </p:extLst>
-  </p:cSld>
-  <p:clrMapOvr>
-    <a:masterClrMapping/>
-  </p:clrMapOvr>
-  <p:transition spd="slow">
-    <p:wipe dir="d"/>
-  </p:transition>
-</p:sld>
-</file>
-
-<file path=ppt/slides/slide4.xml><?xml version="1.0" encoding="utf-8"?>
-<p:sld xmlns:a="http://schemas.openxmlformats.org/drawingml/2006/main" xmlns:r="http://schemas.openxmlformats.org/officeDocument/2006/relationships" xmlns:p="http://schemas.openxmlformats.org/presentationml/2006/main">
-  <p:cSld>
-    <p:spTree>
-      <p:nvGrpSpPr>
-        <p:cNvPr id="1" name=""/>
-        <p:cNvGrpSpPr/>
-        <p:nvPr/>
-      </p:nvGrpSpPr>
-      <p:grpSpPr>
-        <a:xfrm>
-          <a:off x="0" y="0"/>
-          <a:ext cx="0" cy="0"/>
-          <a:chOff x="0" y="0"/>
-          <a:chExt cx="0" cy="0"/>
-        </a:xfrm>
-      </p:grpSpPr>
       <mc:AlternateContent xmlns:mc="http://schemas.openxmlformats.org/markup-compatibility/2006">
         <mc:Choice xmlns:a14="http://schemas.microsoft.com/office/drawing/2010/main" Requires="a14">
           <p:sp>
@@ -12929,7 +12628,7 @@
           <a:p>
             <a:fld id="{1915DC07-6425-4740-9695-FB9F2ED48CC1}" type="slidenum">
               <a:rPr lang="en-US" smtClean="0"/>
-              <a:t>4</a:t>
+              <a:t>3</a:t>
             </a:fld>
             <a:endParaRPr lang="en-US"/>
           </a:p>
@@ -12951,7 +12650,7 @@
 </p:sld>
 </file>
 
-<file path=ppt/slides/slide5.xml><?xml version="1.0" encoding="utf-8"?>
+<file path=ppt/slides/slide4.xml><?xml version="1.0" encoding="utf-8"?>
 <p:sld xmlns:a="http://schemas.openxmlformats.org/drawingml/2006/main" xmlns:r="http://schemas.openxmlformats.org/officeDocument/2006/relationships" xmlns:p="http://schemas.openxmlformats.org/presentationml/2006/main">
   <p:cSld>
     <p:spTree>
@@ -13019,7 +12718,7 @@
           <a:p>
             <a:fld id="{1915DC07-6425-4740-9695-FB9F2ED48CC1}" type="slidenum">
               <a:rPr lang="en-US" smtClean="0"/>
-              <a:t>5</a:t>
+              <a:t>4</a:t>
             </a:fld>
             <a:endParaRPr lang="en-US"/>
           </a:p>
@@ -13071,7 +12770,7 @@
 </p:sld>
 </file>
 
-<file path=ppt/slides/slide6.xml><?xml version="1.0" encoding="utf-8"?>
+<file path=ppt/slides/slide5.xml><?xml version="1.0" encoding="utf-8"?>
 <p:sld xmlns:a="http://schemas.openxmlformats.org/drawingml/2006/main" xmlns:r="http://schemas.openxmlformats.org/officeDocument/2006/relationships" xmlns:p="http://schemas.openxmlformats.org/presentationml/2006/main">
   <p:cSld>
     <p:spTree>
@@ -13139,7 +12838,7 @@
           <a:p>
             <a:fld id="{1915DC07-6425-4740-9695-FB9F2ED48CC1}" type="slidenum">
               <a:rPr lang="en-US" smtClean="0"/>
-              <a:t>6</a:t>
+              <a:t>5</a:t>
             </a:fld>
             <a:endParaRPr lang="en-US"/>
           </a:p>
@@ -13191,7 +12890,7 @@
 </p:sld>
 </file>
 
-<file path=ppt/slides/slide7.xml><?xml version="1.0" encoding="utf-8"?>
+<file path=ppt/slides/slide6.xml><?xml version="1.0" encoding="utf-8"?>
 <p:sld xmlns:a="http://schemas.openxmlformats.org/drawingml/2006/main" xmlns:r="http://schemas.openxmlformats.org/officeDocument/2006/relationships" xmlns:p="http://schemas.openxmlformats.org/presentationml/2006/main">
   <p:cSld>
     <p:spTree>
@@ -13259,7 +12958,7 @@
           <a:p>
             <a:fld id="{1915DC07-6425-4740-9695-FB9F2ED48CC1}" type="slidenum">
               <a:rPr lang="en-US" smtClean="0"/>
-              <a:t>7</a:t>
+              <a:t>6</a:t>
             </a:fld>
             <a:endParaRPr lang="en-US" dirty="0"/>
           </a:p>
@@ -14945,7 +14644,7 @@
               <p:nvPr>
                 <p:extLst>
                   <p:ext uri="{D42A27DB-BD31-4B8C-83A1-F6EECF244321}">
-                    <p14:modId xmlns:p14="http://schemas.microsoft.com/office/powerpoint/2010/main" val="97725323"/>
+                    <p14:modId xmlns:p14="http://schemas.microsoft.com/office/powerpoint/2010/main" val="1187619643"/>
                   </p:ext>
                 </p:extLst>
               </p:nvPr>
@@ -18494,7 +18193,7 @@
                           </a:pPr>
                           <a:r>
                             <a:rPr lang="en-US" sz="1800" dirty="0"/>
-                            <a:t>0.05</a:t>
+                            <a:t>20</a:t>
                           </a:r>
                         </a:p>
                       </a:txBody>
@@ -19204,7 +18903,7 @@
               <p:nvPr>
                 <p:extLst>
                   <p:ext uri="{D42A27DB-BD31-4B8C-83A1-F6EECF244321}">
-                    <p14:modId xmlns:p14="http://schemas.microsoft.com/office/powerpoint/2010/main" val="97725323"/>
+                    <p14:modId xmlns:p14="http://schemas.microsoft.com/office/powerpoint/2010/main" val="1187619643"/>
                   </p:ext>
                 </p:extLst>
               </p:nvPr>
@@ -21859,7 +21558,7 @@
                           </a:pPr>
                           <a:r>
                             <a:rPr lang="en-US" sz="1800" dirty="0"/>
-                            <a:t>0.05</a:t>
+                            <a:t>20</a:t>
                           </a:r>
                         </a:p>
                       </a:txBody>
@@ -23331,7 +23030,7 @@
 </p:sld>
 </file>
 
-<file path=ppt/slides/slide8.xml><?xml version="1.0" encoding="utf-8"?>
+<file path=ppt/slides/slide7.xml><?xml version="1.0" encoding="utf-8"?>
 <p:sld xmlns:a="http://schemas.openxmlformats.org/drawingml/2006/main" xmlns:r="http://schemas.openxmlformats.org/officeDocument/2006/relationships" xmlns:p="http://schemas.openxmlformats.org/presentationml/2006/main">
   <p:cSld>
     <p:spTree>
@@ -23409,7 +23108,7 @@
           <a:p>
             <a:fld id="{1915DC07-6425-4740-9695-FB9F2ED48CC1}" type="slidenum">
               <a:rPr lang="en-US" smtClean="0"/>
-              <a:t>8</a:t>
+              <a:t>7</a:t>
             </a:fld>
             <a:endParaRPr lang="en-US"/>
           </a:p>
@@ -33674,7 +33373,7 @@
 </p:sld>
 </file>
 
-<file path=ppt/slides/slide9.xml><?xml version="1.0" encoding="utf-8"?>
+<file path=ppt/slides/slide8.xml><?xml version="1.0" encoding="utf-8"?>
 <p:sld xmlns:a="http://schemas.openxmlformats.org/drawingml/2006/main" xmlns:r="http://schemas.openxmlformats.org/officeDocument/2006/relationships" xmlns:p="http://schemas.openxmlformats.org/presentationml/2006/main">
   <p:cSld>
     <p:spTree>
@@ -33810,7 +33509,7 @@
           <a:p>
             <a:fld id="{1915DC07-6425-4740-9695-FB9F2ED48CC1}" type="slidenum">
               <a:rPr lang="en-US" smtClean="0"/>
-              <a:t>9</a:t>
+              <a:t>8</a:t>
             </a:fld>
             <a:endParaRPr lang="en-US"/>
           </a:p>
@@ -33850,6 +33549,205 @@
     <p:extLst>
       <p:ext uri="{BB962C8B-B14F-4D97-AF65-F5344CB8AC3E}">
         <p14:creationId xmlns:p14="http://schemas.microsoft.com/office/powerpoint/2010/main" val="3278654512"/>
+      </p:ext>
+    </p:extLst>
+  </p:cSld>
+  <p:clrMapOvr>
+    <a:masterClrMapping/>
+  </p:clrMapOvr>
+  <p:transition>
+    <p:fade/>
+  </p:transition>
+</p:sld>
+</file>
+
+<file path=ppt/slides/slide9.xml><?xml version="1.0" encoding="utf-8"?>
+<p:sld xmlns:a="http://schemas.openxmlformats.org/drawingml/2006/main" xmlns:r="http://schemas.openxmlformats.org/officeDocument/2006/relationships" xmlns:p="http://schemas.openxmlformats.org/presentationml/2006/main">
+  <p:cSld>
+    <p:spTree>
+      <p:nvGrpSpPr>
+        <p:cNvPr id="1" name=""/>
+        <p:cNvGrpSpPr/>
+        <p:nvPr/>
+      </p:nvGrpSpPr>
+      <p:grpSpPr>
+        <a:xfrm>
+          <a:off x="0" y="0"/>
+          <a:ext cx="0" cy="0"/>
+          <a:chOff x="0" y="0"/>
+          <a:chExt cx="0" cy="0"/>
+        </a:xfrm>
+      </p:grpSpPr>
+      <p:sp>
+        <p:nvSpPr>
+          <p:cNvPr id="2" name="Text Placeholder 1">
+            <a:extLst>
+              <a:ext uri="{FF2B5EF4-FFF2-40B4-BE49-F238E27FC236}">
+                <a16:creationId xmlns:a16="http://schemas.microsoft.com/office/drawing/2014/main" id="{CA0539D6-7004-49B9-8C98-B1C8FE42827D}"/>
+              </a:ext>
+            </a:extLst>
+          </p:cNvPr>
+          <p:cNvSpPr>
+            <a:spLocks noGrp="1"/>
+          </p:cNvSpPr>
+          <p:nvPr>
+            <p:ph type="body" sz="quarter" idx="13"/>
+          </p:nvPr>
+        </p:nvSpPr>
+        <p:spPr>
+          <a:xfrm>
+            <a:off x="478369" y="1225486"/>
+            <a:ext cx="11474451" cy="3959802"/>
+          </a:xfrm>
+        </p:spPr>
+        <p:txBody>
+          <a:bodyPr/>
+          <a:lstStyle/>
+          <a:p>
+            <a:pPr marL="0" indent="0">
+              <a:lnSpc>
+                <a:spcPct val="150000"/>
+              </a:lnSpc>
+              <a:buNone/>
+            </a:pPr>
+            <a:r>
+              <a:rPr lang="en-US" dirty="0"/>
+              <a:t>For your MDP from project-3:</a:t>
+            </a:r>
+          </a:p>
+          <a:p>
+            <a:pPr marL="457200" indent="-457200">
+              <a:lnSpc>
+                <a:spcPct val="150000"/>
+              </a:lnSpc>
+              <a:buFont typeface="+mj-lt"/>
+              <a:buAutoNum type="arabicPeriod"/>
+            </a:pPr>
+            <a:r>
+              <a:rPr lang="en-US" dirty="0"/>
+              <a:t>Estimate the rates</a:t>
+            </a:r>
+          </a:p>
+          <a:p>
+            <a:pPr marL="697194" lvl="1" indent="-457200">
+              <a:lnSpc>
+                <a:spcPct val="150000"/>
+              </a:lnSpc>
+            </a:pPr>
+            <a:r>
+              <a:rPr lang="en-US" dirty="0"/>
+              <a:t>Sample timestamps from the DTMC (project-3)</a:t>
+            </a:r>
+          </a:p>
+          <a:p>
+            <a:pPr marL="697194" lvl="1" indent="-457200">
+              <a:lnSpc>
+                <a:spcPct val="150000"/>
+              </a:lnSpc>
+            </a:pPr>
+            <a:r>
+              <a:rPr lang="en-US" dirty="0"/>
+              <a:t>Fit the exponential distributions for each transition</a:t>
+            </a:r>
+          </a:p>
+          <a:p>
+            <a:pPr marL="457200" indent="-457200">
+              <a:lnSpc>
+                <a:spcPct val="150000"/>
+              </a:lnSpc>
+              <a:buFont typeface="+mj-lt"/>
+              <a:buAutoNum type="arabicPeriod"/>
+            </a:pPr>
+            <a:r>
+              <a:rPr lang="en-US" dirty="0"/>
+              <a:t>Adapt the code to use the density functions instead of the transition probabilities</a:t>
+            </a:r>
+          </a:p>
+          <a:p>
+            <a:pPr marL="457200" indent="-457200">
+              <a:lnSpc>
+                <a:spcPct val="150000"/>
+              </a:lnSpc>
+              <a:buFont typeface="+mj-lt"/>
+              <a:buAutoNum type="arabicPeriod"/>
+            </a:pPr>
+            <a:r>
+              <a:rPr lang="en-US" dirty="0"/>
+              <a:t>Rerun the same convergence charts </a:t>
+            </a:r>
+          </a:p>
+          <a:p>
+            <a:pPr marL="239994" lvl="1" indent="0">
+              <a:buNone/>
+            </a:pPr>
+            <a:endParaRPr lang="en-US" dirty="0"/>
+          </a:p>
+          <a:p>
+            <a:endParaRPr lang="en-US" dirty="0"/>
+          </a:p>
+        </p:txBody>
+      </p:sp>
+      <p:sp>
+        <p:nvSpPr>
+          <p:cNvPr id="3" name="Title 2">
+            <a:extLst>
+              <a:ext uri="{FF2B5EF4-FFF2-40B4-BE49-F238E27FC236}">
+                <a16:creationId xmlns:a16="http://schemas.microsoft.com/office/drawing/2014/main" id="{3D6EA5F4-01A3-425D-A9A2-E8F701051409}"/>
+              </a:ext>
+            </a:extLst>
+          </p:cNvPr>
+          <p:cNvSpPr>
+            <a:spLocks noGrp="1"/>
+          </p:cNvSpPr>
+          <p:nvPr>
+            <p:ph type="title"/>
+          </p:nvPr>
+        </p:nvSpPr>
+        <p:spPr/>
+        <p:txBody>
+          <a:bodyPr/>
+          <a:lstStyle/>
+          <a:p>
+            <a:r>
+              <a:rPr lang="en-US" dirty="0"/>
+              <a:t>Task-2</a:t>
+            </a:r>
+          </a:p>
+        </p:txBody>
+      </p:sp>
+      <p:sp>
+        <p:nvSpPr>
+          <p:cNvPr id="4" name="Slide Number Placeholder 3">
+            <a:extLst>
+              <a:ext uri="{FF2B5EF4-FFF2-40B4-BE49-F238E27FC236}">
+                <a16:creationId xmlns:a16="http://schemas.microsoft.com/office/drawing/2014/main" id="{875EDB8B-EFD1-4E68-B528-0AD91D9A4887}"/>
+              </a:ext>
+            </a:extLst>
+          </p:cNvPr>
+          <p:cNvSpPr>
+            <a:spLocks noGrp="1"/>
+          </p:cNvSpPr>
+          <p:nvPr>
+            <p:ph type="sldNum" sz="quarter" idx="16"/>
+          </p:nvPr>
+        </p:nvSpPr>
+        <p:spPr/>
+        <p:txBody>
+          <a:bodyPr/>
+          <a:lstStyle/>
+          <a:p>
+            <a:fld id="{1915DC07-6425-4740-9695-FB9F2ED48CC1}" type="slidenum">
+              <a:rPr lang="en-US" smtClean="0"/>
+              <a:t>9</a:t>
+            </a:fld>
+            <a:endParaRPr lang="en-US"/>
+          </a:p>
+        </p:txBody>
+      </p:sp>
+    </p:spTree>
+    <p:extLst>
+      <p:ext uri="{BB962C8B-B14F-4D97-AF65-F5344CB8AC3E}">
+        <p14:creationId xmlns:p14="http://schemas.microsoft.com/office/powerpoint/2010/main" val="3483294274"/>
       </p:ext>
     </p:extLst>
   </p:cSld>

</xml_diff>